<commit_message>
update first three sections of the report
</commit_message>
<xml_diff>
--- a/doc/img/SystemArchitecture.pptx
+++ b/doc/img/SystemArchitecture.pptx
@@ -3543,7 +3543,14 @@
             <a:pPr algn="ctr"/>
             <a:r>
               <a:rPr lang="en-US" altLang="zh-CN" sz="1400" dirty="0"/>
-              <a:t>Heater/AC-Controller</a:t>
+              <a:t>Human to control</a:t>
+            </a:r>
+          </a:p>
+          <a:p>
+            <a:pPr algn="ctr"/>
+            <a:r>
+              <a:rPr lang="en-US" altLang="zh-CN" sz="1400" dirty="0"/>
+              <a:t>Heater/AC</a:t>
             </a:r>
             <a:endParaRPr lang="zh-CN" altLang="en-US" sz="1400" dirty="0"/>
           </a:p>

</xml_diff>